<commit_message>
Site updated: 2025-09-04 15:31:43
</commit_message>
<xml_diff>
--- a/images/DW分解与列生成/插图制作.pptx
+++ b/images/DW分解与列生成/插图制作.pptx
@@ -6,6 +6,7 @@
   </p:sldMasterIdLst>
   <p:sldIdLst>
     <p:sldId id="256" r:id="rId2"/>
+    <p:sldId id="257" r:id="rId3"/>
   </p:sldIdLst>
   <p:sldSz cx="12192000" cy="6858000"/>
   <p:notesSz cx="6858000" cy="9144000"/>
@@ -3337,171 +3338,705 @@
           <a:chExt cx="0" cy="0"/>
         </a:xfrm>
       </p:grpSpPr>
-      <p:pic>
-        <p:nvPicPr>
-          <p:cNvPr id="7" name="图片 6">
-            <a:extLst>
-              <a:ext uri="{FF2B5EF4-FFF2-40B4-BE49-F238E27FC236}">
-                <a16:creationId xmlns:a16="http://schemas.microsoft.com/office/drawing/2014/main" id="{C616E99A-50D4-D017-DD5B-652E8652204C}"/>
-              </a:ext>
-            </a:extLst>
-          </p:cNvPr>
-          <p:cNvPicPr>
-            <a:picLocks noChangeAspect="1"/>
-          </p:cNvPicPr>
+      <p:grpSp>
+        <p:nvGrpSpPr>
+          <p:cNvPr id="12" name="组合 11">
+            <a:extLst>
+              <a:ext uri="{FF2B5EF4-FFF2-40B4-BE49-F238E27FC236}">
+                <a16:creationId xmlns:a16="http://schemas.microsoft.com/office/drawing/2014/main" id="{FAC2447E-FC25-52D8-6E8E-353CBE2AB319}"/>
+              </a:ext>
+            </a:extLst>
+          </p:cNvPr>
+          <p:cNvGrpSpPr/>
           <p:nvPr/>
-        </p:nvPicPr>
-        <p:blipFill>
-          <a:blip r:embed="rId2">
-            <a:extLst>
-              <a:ext uri="{28A0092B-C50C-407E-A947-70E740481C1C}">
-                <a14:useLocalDpi xmlns:a14="http://schemas.microsoft.com/office/drawing/2010/main" val="0"/>
-              </a:ext>
-            </a:extLst>
-          </a:blip>
-          <a:stretch>
-            <a:fillRect/>
-          </a:stretch>
-        </p:blipFill>
-        <p:spPr>
+        </p:nvGrpSpPr>
+        <p:grpSpPr>
           <a:xfrm>
             <a:off x="1213943" y="241738"/>
-            <a:ext cx="3962400" cy="5667375"/>
+            <a:ext cx="9753601" cy="6893261"/>
+            <a:chOff x="1213943" y="241738"/>
+            <a:chExt cx="9753601" cy="6893261"/>
           </a:xfrm>
-          <a:prstGeom prst="rect">
-            <a:avLst/>
-          </a:prstGeom>
-        </p:spPr>
-      </p:pic>
-      <p:pic>
-        <p:nvPicPr>
-          <p:cNvPr id="9" name="图片 8">
-            <a:extLst>
-              <a:ext uri="{FF2B5EF4-FFF2-40B4-BE49-F238E27FC236}">
-                <a16:creationId xmlns:a16="http://schemas.microsoft.com/office/drawing/2014/main" id="{91EFF809-A8B2-203F-8C1C-D1ACB9981D5E}"/>
-              </a:ext>
-            </a:extLst>
-          </p:cNvPr>
-          <p:cNvPicPr>
-            <a:picLocks noChangeAspect="1"/>
-          </p:cNvPicPr>
-          <p:nvPr/>
-        </p:nvPicPr>
-        <p:blipFill>
-          <a:blip r:embed="rId3">
-            <a:extLst>
-              <a:ext uri="{28A0092B-C50C-407E-A947-70E740481C1C}">
-                <a14:useLocalDpi xmlns:a14="http://schemas.microsoft.com/office/drawing/2010/main" val="0"/>
-              </a:ext>
-            </a:extLst>
-          </a:blip>
-          <a:stretch>
-            <a:fillRect/>
-          </a:stretch>
-        </p:blipFill>
-        <p:spPr>
-          <a:xfrm>
-            <a:off x="7015659" y="241739"/>
-            <a:ext cx="3951885" cy="5667374"/>
-          </a:xfrm>
-          <a:prstGeom prst="rect">
-            <a:avLst/>
-          </a:prstGeom>
-        </p:spPr>
-      </p:pic>
-      <p:sp>
-        <p:nvSpPr>
-          <p:cNvPr id="10" name="文本框 9">
-            <a:extLst>
-              <a:ext uri="{FF2B5EF4-FFF2-40B4-BE49-F238E27FC236}">
-                <a16:creationId xmlns:a16="http://schemas.microsoft.com/office/drawing/2014/main" id="{243E368A-B6D3-8AAA-F922-7C9A01C0FE0C}"/>
-              </a:ext>
-            </a:extLst>
-          </p:cNvPr>
-          <p:cNvSpPr txBox="1"/>
-          <p:nvPr/>
-        </p:nvSpPr>
-        <p:spPr>
-          <a:xfrm>
-            <a:off x="2280469" y="6211669"/>
-            <a:ext cx="1829347" cy="923330"/>
-          </a:xfrm>
-          <a:prstGeom prst="rect">
-            <a:avLst/>
-          </a:prstGeom>
-          <a:noFill/>
-        </p:spPr>
-        <p:txBody>
-          <a:bodyPr wrap="none" rtlCol="0">
-            <a:spAutoFit/>
-          </a:bodyPr>
-          <a:lstStyle/>
-          <a:p>
-            <a:r>
-              <a:rPr lang="en-US" altLang="zh-CN" b="1" dirty="0"/>
-              <a:t>George Dantzig</a:t>
-            </a:r>
-          </a:p>
-          <a:p>
-            <a:r>
-              <a:rPr lang="en-US" altLang="zh-CN" b="1"/>
-              <a:t>1914~2005</a:t>
-            </a:r>
-            <a:endParaRPr lang="en-US" altLang="zh-CN" b="1" dirty="0"/>
-          </a:p>
-          <a:p>
-            <a:endParaRPr lang="zh-CN" altLang="en-US" dirty="0"/>
-          </a:p>
-        </p:txBody>
-      </p:sp>
-      <p:sp>
-        <p:nvSpPr>
-          <p:cNvPr id="11" name="文本框 10">
-            <a:extLst>
-              <a:ext uri="{FF2B5EF4-FFF2-40B4-BE49-F238E27FC236}">
-                <a16:creationId xmlns:a16="http://schemas.microsoft.com/office/drawing/2014/main" id="{1A220168-A627-A597-C345-27FB1674F880}"/>
-              </a:ext>
-            </a:extLst>
-          </p:cNvPr>
-          <p:cNvSpPr txBox="1"/>
-          <p:nvPr/>
-        </p:nvSpPr>
-        <p:spPr>
-          <a:xfrm>
-            <a:off x="8076927" y="6211669"/>
-            <a:ext cx="1465466" cy="923330"/>
-          </a:xfrm>
-          <a:prstGeom prst="rect">
-            <a:avLst/>
-          </a:prstGeom>
-          <a:noFill/>
-        </p:spPr>
-        <p:txBody>
-          <a:bodyPr wrap="none" rtlCol="0">
-            <a:spAutoFit/>
-          </a:bodyPr>
-          <a:lstStyle/>
-          <a:p>
-            <a:r>
-              <a:rPr lang="en-US" altLang="zh-CN" b="1" dirty="0"/>
-              <a:t>Philip Wolfe</a:t>
-            </a:r>
-          </a:p>
-          <a:p>
-            <a:r>
-              <a:rPr lang="en-US" altLang="zh-CN" b="1" dirty="0"/>
-              <a:t>1927~2016</a:t>
-            </a:r>
-          </a:p>
-          <a:p>
-            <a:endParaRPr lang="zh-CN" altLang="en-US" dirty="0"/>
-          </a:p>
-        </p:txBody>
-      </p:sp>
+        </p:grpSpPr>
+        <p:pic>
+          <p:nvPicPr>
+            <p:cNvPr id="7" name="图片 6">
+              <a:extLst>
+                <a:ext uri="{FF2B5EF4-FFF2-40B4-BE49-F238E27FC236}">
+                  <a16:creationId xmlns:a16="http://schemas.microsoft.com/office/drawing/2014/main" id="{C616E99A-50D4-D017-DD5B-652E8652204C}"/>
+                </a:ext>
+              </a:extLst>
+            </p:cNvPr>
+            <p:cNvPicPr>
+              <a:picLocks noChangeAspect="1"/>
+            </p:cNvPicPr>
+            <p:nvPr/>
+          </p:nvPicPr>
+          <p:blipFill>
+            <a:blip r:embed="rId2">
+              <a:extLst>
+                <a:ext uri="{28A0092B-C50C-407E-A947-70E740481C1C}">
+                  <a14:useLocalDpi xmlns:a14="http://schemas.microsoft.com/office/drawing/2010/main" val="0"/>
+                </a:ext>
+              </a:extLst>
+            </a:blip>
+            <a:stretch>
+              <a:fillRect/>
+            </a:stretch>
+          </p:blipFill>
+          <p:spPr>
+            <a:xfrm>
+              <a:off x="1213943" y="241738"/>
+              <a:ext cx="3962400" cy="5667375"/>
+            </a:xfrm>
+            <a:prstGeom prst="rect">
+              <a:avLst/>
+            </a:prstGeom>
+          </p:spPr>
+        </p:pic>
+        <p:pic>
+          <p:nvPicPr>
+            <p:cNvPr id="9" name="图片 8">
+              <a:extLst>
+                <a:ext uri="{FF2B5EF4-FFF2-40B4-BE49-F238E27FC236}">
+                  <a16:creationId xmlns:a16="http://schemas.microsoft.com/office/drawing/2014/main" id="{91EFF809-A8B2-203F-8C1C-D1ACB9981D5E}"/>
+                </a:ext>
+              </a:extLst>
+            </p:cNvPr>
+            <p:cNvPicPr>
+              <a:picLocks noChangeAspect="1"/>
+            </p:cNvPicPr>
+            <p:nvPr/>
+          </p:nvPicPr>
+          <p:blipFill>
+            <a:blip r:embed="rId3">
+              <a:extLst>
+                <a:ext uri="{28A0092B-C50C-407E-A947-70E740481C1C}">
+                  <a14:useLocalDpi xmlns:a14="http://schemas.microsoft.com/office/drawing/2010/main" val="0"/>
+                </a:ext>
+              </a:extLst>
+            </a:blip>
+            <a:stretch>
+              <a:fillRect/>
+            </a:stretch>
+          </p:blipFill>
+          <p:spPr>
+            <a:xfrm>
+              <a:off x="7015659" y="241739"/>
+              <a:ext cx="3951885" cy="5667374"/>
+            </a:xfrm>
+            <a:prstGeom prst="rect">
+              <a:avLst/>
+            </a:prstGeom>
+          </p:spPr>
+        </p:pic>
+        <p:sp>
+          <p:nvSpPr>
+            <p:cNvPr id="10" name="文本框 9">
+              <a:extLst>
+                <a:ext uri="{FF2B5EF4-FFF2-40B4-BE49-F238E27FC236}">
+                  <a16:creationId xmlns:a16="http://schemas.microsoft.com/office/drawing/2014/main" id="{243E368A-B6D3-8AAA-F922-7C9A01C0FE0C}"/>
+                </a:ext>
+              </a:extLst>
+            </p:cNvPr>
+            <p:cNvSpPr txBox="1"/>
+            <p:nvPr/>
+          </p:nvSpPr>
+          <p:spPr>
+            <a:xfrm>
+              <a:off x="2280469" y="6211669"/>
+              <a:ext cx="1829347" cy="923330"/>
+            </a:xfrm>
+            <a:prstGeom prst="rect">
+              <a:avLst/>
+            </a:prstGeom>
+            <a:noFill/>
+          </p:spPr>
+          <p:txBody>
+            <a:bodyPr wrap="none" rtlCol="0">
+              <a:spAutoFit/>
+            </a:bodyPr>
+            <a:lstStyle/>
+            <a:p>
+              <a:r>
+                <a:rPr lang="en-US" altLang="zh-CN" b="1" dirty="0"/>
+                <a:t>George Dantzig</a:t>
+              </a:r>
+            </a:p>
+            <a:p>
+              <a:r>
+                <a:rPr lang="en-US" altLang="zh-CN" b="1" dirty="0"/>
+                <a:t>1914~2005</a:t>
+              </a:r>
+            </a:p>
+            <a:p>
+              <a:endParaRPr lang="zh-CN" altLang="en-US" dirty="0"/>
+            </a:p>
+          </p:txBody>
+        </p:sp>
+        <p:sp>
+          <p:nvSpPr>
+            <p:cNvPr id="11" name="文本框 10">
+              <a:extLst>
+                <a:ext uri="{FF2B5EF4-FFF2-40B4-BE49-F238E27FC236}">
+                  <a16:creationId xmlns:a16="http://schemas.microsoft.com/office/drawing/2014/main" id="{1A220168-A627-A597-C345-27FB1674F880}"/>
+                </a:ext>
+              </a:extLst>
+            </p:cNvPr>
+            <p:cNvSpPr txBox="1"/>
+            <p:nvPr/>
+          </p:nvSpPr>
+          <p:spPr>
+            <a:xfrm>
+              <a:off x="8276623" y="6211669"/>
+              <a:ext cx="2496480" cy="923330"/>
+            </a:xfrm>
+            <a:prstGeom prst="rect">
+              <a:avLst/>
+            </a:prstGeom>
+            <a:noFill/>
+          </p:spPr>
+          <p:txBody>
+            <a:bodyPr wrap="square" rtlCol="0">
+              <a:spAutoFit/>
+            </a:bodyPr>
+            <a:lstStyle/>
+            <a:p>
+              <a:r>
+                <a:rPr lang="en-US" altLang="zh-CN" b="1" dirty="0"/>
+                <a:t>Philip Wolfe</a:t>
+              </a:r>
+            </a:p>
+            <a:p>
+              <a:r>
+                <a:rPr lang="en-US" altLang="zh-CN" b="1" dirty="0"/>
+                <a:t>1927~2016</a:t>
+              </a:r>
+            </a:p>
+            <a:p>
+              <a:endParaRPr lang="zh-CN" altLang="en-US" dirty="0"/>
+            </a:p>
+          </p:txBody>
+        </p:sp>
+      </p:grpSp>
     </p:spTree>
     <p:extLst>
       <p:ext uri="{BB962C8B-B14F-4D97-AF65-F5344CB8AC3E}">
         <p14:creationId xmlns:p14="http://schemas.microsoft.com/office/powerpoint/2010/main" val="321110592"/>
+      </p:ext>
+    </p:extLst>
+  </p:cSld>
+  <p:clrMapOvr>
+    <a:masterClrMapping/>
+  </p:clrMapOvr>
+</p:sld>
+</file>
+
+<file path=ppt/slides/slide2.xml><?xml version="1.0" encoding="utf-8"?>
+<p:sld xmlns:a="http://schemas.openxmlformats.org/drawingml/2006/main" xmlns:r="http://schemas.openxmlformats.org/officeDocument/2006/relationships" xmlns:p="http://schemas.openxmlformats.org/presentationml/2006/main">
+  <p:cSld>
+    <p:spTree>
+      <p:nvGrpSpPr>
+        <p:cNvPr id="1" name=""/>
+        <p:cNvGrpSpPr/>
+        <p:nvPr/>
+      </p:nvGrpSpPr>
+      <p:grpSpPr>
+        <a:xfrm>
+          <a:off x="0" y="0"/>
+          <a:ext cx="0" cy="0"/>
+          <a:chOff x="0" y="0"/>
+          <a:chExt cx="0" cy="0"/>
+        </a:xfrm>
+      </p:grpSpPr>
+      <p:grpSp>
+        <p:nvGrpSpPr>
+          <p:cNvPr id="11" name="组合 10">
+            <a:extLst>
+              <a:ext uri="{FF2B5EF4-FFF2-40B4-BE49-F238E27FC236}">
+                <a16:creationId xmlns:a16="http://schemas.microsoft.com/office/drawing/2014/main" id="{5A5660D4-EEE7-C74D-674A-D46EE355E652}"/>
+              </a:ext>
+            </a:extLst>
+          </p:cNvPr>
+          <p:cNvGrpSpPr/>
+          <p:nvPr/>
+        </p:nvGrpSpPr>
+        <p:grpSpPr>
+          <a:xfrm>
+            <a:off x="2969873" y="1874695"/>
+            <a:ext cx="4466897" cy="2511973"/>
+            <a:chOff x="704193" y="1681655"/>
+            <a:chExt cx="4466897" cy="2511973"/>
+          </a:xfrm>
+        </p:grpSpPr>
+        <p:cxnSp>
+          <p:nvCxnSpPr>
+            <p:cNvPr id="6" name="直接连接符 5">
+              <a:extLst>
+                <a:ext uri="{FF2B5EF4-FFF2-40B4-BE49-F238E27FC236}">
+                  <a16:creationId xmlns:a16="http://schemas.microsoft.com/office/drawing/2014/main" id="{F31CBBFA-FF01-12C2-6FE6-979AFCB3C7EE}"/>
+                </a:ext>
+              </a:extLst>
+            </p:cNvPr>
+            <p:cNvCxnSpPr/>
+            <p:nvPr/>
+          </p:nvCxnSpPr>
+          <p:spPr>
+            <a:xfrm>
+              <a:off x="704193" y="1681655"/>
+              <a:ext cx="840828" cy="2511973"/>
+            </a:xfrm>
+            <a:prstGeom prst="line">
+              <a:avLst/>
+            </a:prstGeom>
+            <a:ln w="15875">
+              <a:solidFill>
+                <a:schemeClr val="tx1"/>
+              </a:solidFill>
+            </a:ln>
+          </p:spPr>
+          <p:style>
+            <a:lnRef idx="1">
+              <a:schemeClr val="accent1"/>
+            </a:lnRef>
+            <a:fillRef idx="0">
+              <a:schemeClr val="accent1"/>
+            </a:fillRef>
+            <a:effectRef idx="0">
+              <a:schemeClr val="accent1"/>
+            </a:effectRef>
+            <a:fontRef idx="minor">
+              <a:schemeClr val="tx1"/>
+            </a:fontRef>
+          </p:style>
+        </p:cxnSp>
+        <p:cxnSp>
+          <p:nvCxnSpPr>
+            <p:cNvPr id="8" name="直接连接符 7">
+              <a:extLst>
+                <a:ext uri="{FF2B5EF4-FFF2-40B4-BE49-F238E27FC236}">
+                  <a16:creationId xmlns:a16="http://schemas.microsoft.com/office/drawing/2014/main" id="{5F495AED-74E1-9518-4F71-CE614BD07D45}"/>
+                </a:ext>
+              </a:extLst>
+            </p:cNvPr>
+            <p:cNvCxnSpPr/>
+            <p:nvPr/>
+          </p:nvCxnSpPr>
+          <p:spPr>
+            <a:xfrm>
+              <a:off x="1545021" y="4193628"/>
+              <a:ext cx="3626069" cy="0"/>
+            </a:xfrm>
+            <a:prstGeom prst="line">
+              <a:avLst/>
+            </a:prstGeom>
+            <a:ln w="15875">
+              <a:solidFill>
+                <a:schemeClr val="tx1"/>
+              </a:solidFill>
+            </a:ln>
+          </p:spPr>
+          <p:style>
+            <a:lnRef idx="1">
+              <a:schemeClr val="accent1"/>
+            </a:lnRef>
+            <a:fillRef idx="0">
+              <a:schemeClr val="accent1"/>
+            </a:fillRef>
+            <a:effectRef idx="0">
+              <a:schemeClr val="accent1"/>
+            </a:effectRef>
+            <a:fontRef idx="minor">
+              <a:schemeClr val="tx1"/>
+            </a:fontRef>
+          </p:style>
+        </p:cxnSp>
+        <p:cxnSp>
+          <p:nvCxnSpPr>
+            <p:cNvPr id="10" name="直接连接符 9">
+              <a:extLst>
+                <a:ext uri="{FF2B5EF4-FFF2-40B4-BE49-F238E27FC236}">
+                  <a16:creationId xmlns:a16="http://schemas.microsoft.com/office/drawing/2014/main" id="{DC1B1EA7-11D1-DA6E-3B30-81C23C628832}"/>
+                </a:ext>
+              </a:extLst>
+            </p:cNvPr>
+            <p:cNvCxnSpPr/>
+            <p:nvPr/>
+          </p:nvCxnSpPr>
+          <p:spPr>
+            <a:xfrm flipV="1">
+              <a:off x="5171090" y="1681655"/>
+              <a:ext cx="0" cy="2511973"/>
+            </a:xfrm>
+            <a:prstGeom prst="line">
+              <a:avLst/>
+            </a:prstGeom>
+            <a:ln w="15875">
+              <a:solidFill>
+                <a:schemeClr val="tx1"/>
+              </a:solidFill>
+            </a:ln>
+          </p:spPr>
+          <p:style>
+            <a:lnRef idx="1">
+              <a:schemeClr val="accent1"/>
+            </a:lnRef>
+            <a:fillRef idx="0">
+              <a:schemeClr val="accent1"/>
+            </a:fillRef>
+            <a:effectRef idx="0">
+              <a:schemeClr val="accent1"/>
+            </a:effectRef>
+            <a:fontRef idx="minor">
+              <a:schemeClr val="tx1"/>
+            </a:fontRef>
+          </p:style>
+        </p:cxnSp>
+      </p:grpSp>
+      <p:cxnSp>
+        <p:nvCxnSpPr>
+          <p:cNvPr id="23" name="直接箭头连接符 22">
+            <a:extLst>
+              <a:ext uri="{FF2B5EF4-FFF2-40B4-BE49-F238E27FC236}">
+                <a16:creationId xmlns:a16="http://schemas.microsoft.com/office/drawing/2014/main" id="{A9ADCDA9-EADD-C9C7-2932-967F4910B9A9}"/>
+              </a:ext>
+            </a:extLst>
+          </p:cNvPr>
+          <p:cNvCxnSpPr>
+            <a:cxnSpLocks/>
+          </p:cNvCxnSpPr>
+          <p:nvPr/>
+        </p:nvCxnSpPr>
+        <p:spPr>
+          <a:xfrm flipV="1">
+            <a:off x="3810701" y="1127760"/>
+            <a:ext cx="0" cy="3258908"/>
+          </a:xfrm>
+          <a:prstGeom prst="straightConnector1">
+            <a:avLst/>
+          </a:prstGeom>
+          <a:ln w="12700">
+            <a:solidFill>
+              <a:srgbClr val="FF0000"/>
+            </a:solidFill>
+            <a:tailEnd type="triangle"/>
+          </a:ln>
+        </p:spPr>
+        <p:style>
+          <a:lnRef idx="1">
+            <a:schemeClr val="accent1"/>
+          </a:lnRef>
+          <a:fillRef idx="0">
+            <a:schemeClr val="accent1"/>
+          </a:fillRef>
+          <a:effectRef idx="0">
+            <a:schemeClr val="accent1"/>
+          </a:effectRef>
+          <a:fontRef idx="minor">
+            <a:schemeClr val="tx1"/>
+          </a:fontRef>
+        </p:style>
+      </p:cxnSp>
+      <p:cxnSp>
+        <p:nvCxnSpPr>
+          <p:cNvPr id="25" name="直接箭头连接符 24">
+            <a:extLst>
+              <a:ext uri="{FF2B5EF4-FFF2-40B4-BE49-F238E27FC236}">
+                <a16:creationId xmlns:a16="http://schemas.microsoft.com/office/drawing/2014/main" id="{1394E6C1-FCA1-5127-27A0-4A43DE83FC6B}"/>
+              </a:ext>
+            </a:extLst>
+          </p:cNvPr>
+          <p:cNvCxnSpPr>
+            <a:cxnSpLocks/>
+          </p:cNvCxnSpPr>
+          <p:nvPr/>
+        </p:nvCxnSpPr>
+        <p:spPr>
+          <a:xfrm flipH="1" flipV="1">
+            <a:off x="2702560" y="1127760"/>
+            <a:ext cx="1108141" cy="3258908"/>
+          </a:xfrm>
+          <a:prstGeom prst="straightConnector1">
+            <a:avLst/>
+          </a:prstGeom>
+          <a:ln w="12700">
+            <a:solidFill>
+              <a:srgbClr val="FF0000"/>
+            </a:solidFill>
+            <a:tailEnd type="triangle"/>
+          </a:ln>
+        </p:spPr>
+        <p:style>
+          <a:lnRef idx="1">
+            <a:schemeClr val="accent1"/>
+          </a:lnRef>
+          <a:fillRef idx="0">
+            <a:schemeClr val="accent1"/>
+          </a:fillRef>
+          <a:effectRef idx="0">
+            <a:schemeClr val="accent1"/>
+          </a:effectRef>
+          <a:fontRef idx="minor">
+            <a:schemeClr val="tx1"/>
+          </a:fontRef>
+        </p:style>
+      </p:cxnSp>
+      <p:grpSp>
+        <p:nvGrpSpPr>
+          <p:cNvPr id="40" name="组合 39">
+            <a:extLst>
+              <a:ext uri="{FF2B5EF4-FFF2-40B4-BE49-F238E27FC236}">
+                <a16:creationId xmlns:a16="http://schemas.microsoft.com/office/drawing/2014/main" id="{F0B35109-C6CE-58F6-2952-A60508AB4548}"/>
+              </a:ext>
+            </a:extLst>
+          </p:cNvPr>
+          <p:cNvGrpSpPr/>
+          <p:nvPr/>
+        </p:nvGrpSpPr>
+        <p:grpSpPr>
+          <a:xfrm>
+            <a:off x="3810702" y="4216400"/>
+            <a:ext cx="111058" cy="149947"/>
+            <a:chOff x="3810701" y="4145280"/>
+            <a:chExt cx="263459" cy="221068"/>
+          </a:xfrm>
+        </p:grpSpPr>
+        <p:cxnSp>
+          <p:nvCxnSpPr>
+            <p:cNvPr id="37" name="直接连接符 36">
+              <a:extLst>
+                <a:ext uri="{FF2B5EF4-FFF2-40B4-BE49-F238E27FC236}">
+                  <a16:creationId xmlns:a16="http://schemas.microsoft.com/office/drawing/2014/main" id="{0B549C3D-8579-4772-6128-F99FB92EEC2F}"/>
+                </a:ext>
+              </a:extLst>
+            </p:cNvPr>
+            <p:cNvCxnSpPr/>
+            <p:nvPr/>
+          </p:nvCxnSpPr>
+          <p:spPr>
+            <a:xfrm>
+              <a:off x="3810701" y="4145280"/>
+              <a:ext cx="263459" cy="0"/>
+            </a:xfrm>
+            <a:prstGeom prst="line">
+              <a:avLst/>
+            </a:prstGeom>
+            <a:ln w="9525">
+              <a:solidFill>
+                <a:schemeClr val="tx1"/>
+              </a:solidFill>
+            </a:ln>
+          </p:spPr>
+          <p:style>
+            <a:lnRef idx="1">
+              <a:schemeClr val="accent1"/>
+            </a:lnRef>
+            <a:fillRef idx="0">
+              <a:schemeClr val="accent1"/>
+            </a:fillRef>
+            <a:effectRef idx="0">
+              <a:schemeClr val="accent1"/>
+            </a:effectRef>
+            <a:fontRef idx="minor">
+              <a:schemeClr val="tx1"/>
+            </a:fontRef>
+          </p:style>
+        </p:cxnSp>
+        <p:cxnSp>
+          <p:nvCxnSpPr>
+            <p:cNvPr id="39" name="直接连接符 38">
+              <a:extLst>
+                <a:ext uri="{FF2B5EF4-FFF2-40B4-BE49-F238E27FC236}">
+                  <a16:creationId xmlns:a16="http://schemas.microsoft.com/office/drawing/2014/main" id="{DFCA7079-812D-C7B6-01B3-33A7DD1F7B57}"/>
+                </a:ext>
+              </a:extLst>
+            </p:cNvPr>
+            <p:cNvCxnSpPr/>
+            <p:nvPr/>
+          </p:nvCxnSpPr>
+          <p:spPr>
+            <a:xfrm>
+              <a:off x="4074160" y="4155440"/>
+              <a:ext cx="0" cy="210908"/>
+            </a:xfrm>
+            <a:prstGeom prst="line">
+              <a:avLst/>
+            </a:prstGeom>
+            <a:ln w="9525">
+              <a:solidFill>
+                <a:schemeClr val="tx1"/>
+              </a:solidFill>
+            </a:ln>
+          </p:spPr>
+          <p:style>
+            <a:lnRef idx="1">
+              <a:schemeClr val="accent1"/>
+            </a:lnRef>
+            <a:fillRef idx="0">
+              <a:schemeClr val="accent1"/>
+            </a:fillRef>
+            <a:effectRef idx="0">
+              <a:schemeClr val="accent1"/>
+            </a:effectRef>
+            <a:fontRef idx="minor">
+              <a:schemeClr val="tx1"/>
+            </a:fontRef>
+          </p:style>
+        </p:cxnSp>
+      </p:grpSp>
+      <p:grpSp>
+        <p:nvGrpSpPr>
+          <p:cNvPr id="41" name="组合 40">
+            <a:extLst>
+              <a:ext uri="{FF2B5EF4-FFF2-40B4-BE49-F238E27FC236}">
+                <a16:creationId xmlns:a16="http://schemas.microsoft.com/office/drawing/2014/main" id="{17E0AA09-A681-93DF-D006-C9D1999DCA3B}"/>
+              </a:ext>
+            </a:extLst>
+          </p:cNvPr>
+          <p:cNvGrpSpPr/>
+          <p:nvPr/>
+        </p:nvGrpSpPr>
+        <p:grpSpPr>
+          <a:xfrm rot="16200000">
+            <a:off x="7290501" y="4237595"/>
+            <a:ext cx="111058" cy="149947"/>
+            <a:chOff x="3810701" y="4145280"/>
+            <a:chExt cx="263459" cy="221068"/>
+          </a:xfrm>
+        </p:grpSpPr>
+        <p:cxnSp>
+          <p:nvCxnSpPr>
+            <p:cNvPr id="42" name="直接连接符 41">
+              <a:extLst>
+                <a:ext uri="{FF2B5EF4-FFF2-40B4-BE49-F238E27FC236}">
+                  <a16:creationId xmlns:a16="http://schemas.microsoft.com/office/drawing/2014/main" id="{95190F08-777C-A1D1-A5B3-C8CE7661FB82}"/>
+                </a:ext>
+              </a:extLst>
+            </p:cNvPr>
+            <p:cNvCxnSpPr/>
+            <p:nvPr/>
+          </p:nvCxnSpPr>
+          <p:spPr>
+            <a:xfrm>
+              <a:off x="3810701" y="4145280"/>
+              <a:ext cx="263459" cy="0"/>
+            </a:xfrm>
+            <a:prstGeom prst="line">
+              <a:avLst/>
+            </a:prstGeom>
+            <a:ln w="9525">
+              <a:solidFill>
+                <a:schemeClr val="tx1"/>
+              </a:solidFill>
+            </a:ln>
+          </p:spPr>
+          <p:style>
+            <a:lnRef idx="1">
+              <a:schemeClr val="accent1"/>
+            </a:lnRef>
+            <a:fillRef idx="0">
+              <a:schemeClr val="accent1"/>
+            </a:fillRef>
+            <a:effectRef idx="0">
+              <a:schemeClr val="accent1"/>
+            </a:effectRef>
+            <a:fontRef idx="minor">
+              <a:schemeClr val="tx1"/>
+            </a:fontRef>
+          </p:style>
+        </p:cxnSp>
+        <p:cxnSp>
+          <p:nvCxnSpPr>
+            <p:cNvPr id="43" name="直接连接符 42">
+              <a:extLst>
+                <a:ext uri="{FF2B5EF4-FFF2-40B4-BE49-F238E27FC236}">
+                  <a16:creationId xmlns:a16="http://schemas.microsoft.com/office/drawing/2014/main" id="{7EB3CDE7-EE10-9AD7-645C-B90001561384}"/>
+                </a:ext>
+              </a:extLst>
+            </p:cNvPr>
+            <p:cNvCxnSpPr/>
+            <p:nvPr/>
+          </p:nvCxnSpPr>
+          <p:spPr>
+            <a:xfrm>
+              <a:off x="4074160" y="4155440"/>
+              <a:ext cx="0" cy="210908"/>
+            </a:xfrm>
+            <a:prstGeom prst="line">
+              <a:avLst/>
+            </a:prstGeom>
+            <a:ln w="9525">
+              <a:solidFill>
+                <a:schemeClr val="tx1"/>
+              </a:solidFill>
+            </a:ln>
+          </p:spPr>
+          <p:style>
+            <a:lnRef idx="1">
+              <a:schemeClr val="accent1"/>
+            </a:lnRef>
+            <a:fillRef idx="0">
+              <a:schemeClr val="accent1"/>
+            </a:fillRef>
+            <a:effectRef idx="0">
+              <a:schemeClr val="accent1"/>
+            </a:effectRef>
+            <a:fontRef idx="minor">
+              <a:schemeClr val="tx1"/>
+            </a:fontRef>
+          </p:style>
+        </p:cxnSp>
+      </p:grpSp>
+      <p:sp>
+        <p:nvSpPr>
+          <p:cNvPr id="44" name="直角三角形 43">
+            <a:extLst>
+              <a:ext uri="{FF2B5EF4-FFF2-40B4-BE49-F238E27FC236}">
+                <a16:creationId xmlns:a16="http://schemas.microsoft.com/office/drawing/2014/main" id="{BAA300A1-1DA3-42B4-0B20-8426B302EB10}"/>
+              </a:ext>
+            </a:extLst>
+          </p:cNvPr>
+          <p:cNvSpPr/>
+          <p:nvPr/>
+        </p:nvSpPr>
+        <p:spPr>
+          <a:xfrm rot="10800000">
+            <a:off x="2875279" y="1595119"/>
+            <a:ext cx="935419" cy="2771224"/>
+          </a:xfrm>
+          <a:prstGeom prst="rtTriangle">
+            <a:avLst/>
+          </a:prstGeom>
+        </p:spPr>
+        <p:style>
+          <a:lnRef idx="2">
+            <a:schemeClr val="accent1">
+              <a:shade val="15000"/>
+            </a:schemeClr>
+          </a:lnRef>
+          <a:fillRef idx="1">
+            <a:schemeClr val="accent1"/>
+          </a:fillRef>
+          <a:effectRef idx="0">
+            <a:schemeClr val="accent1"/>
+          </a:effectRef>
+          <a:fontRef idx="minor">
+            <a:schemeClr val="lt1"/>
+          </a:fontRef>
+        </p:style>
+        <p:txBody>
+          <a:bodyPr rtlCol="0" anchor="ctr"/>
+          <a:lstStyle/>
+          <a:p>
+            <a:pPr algn="ctr"/>
+            <a:endParaRPr lang="zh-CN" altLang="en-US"/>
+          </a:p>
+        </p:txBody>
+      </p:sp>
+    </p:spTree>
+    <p:extLst>
+      <p:ext uri="{BB962C8B-B14F-4D97-AF65-F5344CB8AC3E}">
+        <p14:creationId xmlns:p14="http://schemas.microsoft.com/office/powerpoint/2010/main" val="4271848381"/>
       </p:ext>
     </p:extLst>
   </p:cSld>

</xml_diff>